<commit_message>
Updated the user manual
</commit_message>
<xml_diff>
--- a/Docs/UserManual.pptx
+++ b/Docs/UserManual.pptx
@@ -117,10 +117,10 @@
   </p:defaultTextStyle>
   <p:extLst>
     <p:ext uri="{EFAFB233-063F-42B5-8137-9DF3F51BA10A}">
-      <p15:sldGuideLst xmlns="" xmlns:p15="http://schemas.microsoft.com/office/powerpoint/2012/main"/>
+      <p15:sldGuideLst xmlns:p15="http://schemas.microsoft.com/office/powerpoint/2012/main" xmlns=""/>
     </p:ext>
     <p:ext uri="{2D200454-40CA-4A62-9FC3-DE9A4176ACB9}">
-      <p15:notesGuideLst xmlns="" xmlns:p15="http://schemas.microsoft.com/office/powerpoint/2012/main"/>
+      <p15:notesGuideLst xmlns:p15="http://schemas.microsoft.com/office/powerpoint/2012/main" xmlns=""/>
     </p:ext>
   </p:extLst>
 </p:presentation>
@@ -289,7 +289,7 @@
     </p:spTree>
     <p:extLst>
       <p:ext uri="{BB962C8B-B14F-4D97-AF65-F5344CB8AC3E}">
-        <p14:creationId xmlns="" xmlns:p14="http://schemas.microsoft.com/office/powerpoint/2010/main" val="2733249305"/>
+        <p14:creationId xmlns:p14="http://schemas.microsoft.com/office/powerpoint/2010/main" xmlns="" val="2733249305"/>
       </p:ext>
     </p:extLst>
   </p:cSld>
@@ -552,7 +552,7 @@
     </p:spTree>
     <p:extLst>
       <p:ext uri="{BB962C8B-B14F-4D97-AF65-F5344CB8AC3E}">
-        <p14:creationId xmlns="" xmlns:p14="http://schemas.microsoft.com/office/powerpoint/2010/main" val="649258610"/>
+        <p14:creationId xmlns:p14="http://schemas.microsoft.com/office/powerpoint/2010/main" xmlns="" val="649258610"/>
       </p:ext>
     </p:extLst>
   </p:cSld>
@@ -734,7 +734,7 @@
     </p:spTree>
     <p:extLst>
       <p:ext uri="{BB962C8B-B14F-4D97-AF65-F5344CB8AC3E}">
-        <p14:creationId xmlns="" xmlns:p14="http://schemas.microsoft.com/office/powerpoint/2010/main" val="3859257745"/>
+        <p14:creationId xmlns:p14="http://schemas.microsoft.com/office/powerpoint/2010/main" xmlns="" val="3859257745"/>
       </p:ext>
     </p:extLst>
   </p:cSld>
@@ -826,7 +826,7 @@
     </p:spTree>
     <p:extLst>
       <p:ext uri="{BB962C8B-B14F-4D97-AF65-F5344CB8AC3E}">
-        <p14:creationId xmlns="" xmlns:p14="http://schemas.microsoft.com/office/powerpoint/2010/main" val="3859257745"/>
+        <p14:creationId xmlns:p14="http://schemas.microsoft.com/office/powerpoint/2010/main" xmlns="" val="3859257745"/>
       </p:ext>
     </p:extLst>
   </p:cSld>
@@ -918,7 +918,7 @@
     </p:spTree>
     <p:extLst>
       <p:ext uri="{BB962C8B-B14F-4D97-AF65-F5344CB8AC3E}">
-        <p14:creationId xmlns="" xmlns:p14="http://schemas.microsoft.com/office/powerpoint/2010/main" val="3859257745"/>
+        <p14:creationId xmlns:p14="http://schemas.microsoft.com/office/powerpoint/2010/main" xmlns="" val="3859257745"/>
       </p:ext>
     </p:extLst>
   </p:cSld>
@@ -1010,7 +1010,7 @@
     </p:spTree>
     <p:extLst>
       <p:ext uri="{BB962C8B-B14F-4D97-AF65-F5344CB8AC3E}">
-        <p14:creationId xmlns="" xmlns:p14="http://schemas.microsoft.com/office/powerpoint/2010/main" val="3859257745"/>
+        <p14:creationId xmlns:p14="http://schemas.microsoft.com/office/powerpoint/2010/main" xmlns="" val="3859257745"/>
       </p:ext>
     </p:extLst>
   </p:cSld>
@@ -1102,7 +1102,7 @@
     </p:spTree>
     <p:extLst>
       <p:ext uri="{BB962C8B-B14F-4D97-AF65-F5344CB8AC3E}">
-        <p14:creationId xmlns="" xmlns:p14="http://schemas.microsoft.com/office/powerpoint/2010/main" val="3859257745"/>
+        <p14:creationId xmlns:p14="http://schemas.microsoft.com/office/powerpoint/2010/main" xmlns="" val="3859257745"/>
       </p:ext>
     </p:extLst>
   </p:cSld>
@@ -1194,7 +1194,7 @@
     </p:spTree>
     <p:extLst>
       <p:ext uri="{BB962C8B-B14F-4D97-AF65-F5344CB8AC3E}">
-        <p14:creationId xmlns="" xmlns:p14="http://schemas.microsoft.com/office/powerpoint/2010/main" val="3859257745"/>
+        <p14:creationId xmlns:p14="http://schemas.microsoft.com/office/powerpoint/2010/main" xmlns="" val="3859257745"/>
       </p:ext>
     </p:extLst>
   </p:cSld>
@@ -21767,10 +21767,10 @@
           <p:cNvPr id="19" name="Rektangel 18">
             <a:extLst>
               <a:ext uri="{FF2B5EF4-FFF2-40B4-BE49-F238E27FC236}">
-                <a16:creationId xmlns="" xmlns:a16="http://schemas.microsoft.com/office/drawing/2014/main" id="{2FDF0794-1B86-42B2-B8C7-F60123E638ED}"/>
+                <a16:creationId xmlns:a16="http://schemas.microsoft.com/office/drawing/2014/main" xmlns="" id="{2FDF0794-1B86-42B2-B8C7-F60123E638ED}"/>
               </a:ext>
               <a:ext uri="{C183D7F6-B498-43B3-948B-1728B52AA6E4}">
-                <adec:decorative xmlns="" xmlns:adec="http://schemas.microsoft.com/office/drawing/2017/decorative" val="1"/>
+                <adec:decorative xmlns:adec="http://schemas.microsoft.com/office/drawing/2017/decorative" xmlns="" val="1"/>
               </a:ext>
             </a:extLst>
           </p:cNvPr>
@@ -21780,7 +21780,7 @@
           <p:nvPr>
             <p:extLst>
               <p:ext uri="{386F3935-93C4-4BCD-93E2-E3B085C9AB24}">
-                <p16:designElem xmlns="" xmlns:p16="http://schemas.microsoft.com/office/powerpoint/2015/main" val="1"/>
+                <p16:designElem xmlns:p16="http://schemas.microsoft.com/office/powerpoint/2015/main" xmlns="" val="1"/>
               </p:ext>
             </p:extLst>
           </p:nvPr>
@@ -21856,10 +21856,10 @@
           <p:cNvPr id="21" name="Rektangel 20">
             <a:extLst>
               <a:ext uri="{FF2B5EF4-FFF2-40B4-BE49-F238E27FC236}">
-                <a16:creationId xmlns="" xmlns:a16="http://schemas.microsoft.com/office/drawing/2014/main" id="{EAA48FC5-3C83-4F1B-BC33-DF0B588F8317}"/>
+                <a16:creationId xmlns:a16="http://schemas.microsoft.com/office/drawing/2014/main" xmlns="" id="{EAA48FC5-3C83-4F1B-BC33-DF0B588F8317}"/>
               </a:ext>
               <a:ext uri="{C183D7F6-B498-43B3-948B-1728B52AA6E4}">
-                <adec:decorative xmlns="" xmlns:adec="http://schemas.microsoft.com/office/drawing/2017/decorative" val="1"/>
+                <adec:decorative xmlns:adec="http://schemas.microsoft.com/office/drawing/2017/decorative" xmlns="" val="1"/>
               </a:ext>
             </a:extLst>
           </p:cNvPr>
@@ -21869,7 +21869,7 @@
           <p:nvPr>
             <p:extLst>
               <p:ext uri="{386F3935-93C4-4BCD-93E2-E3B085C9AB24}">
-                <p16:designElem xmlns="" xmlns:p16="http://schemas.microsoft.com/office/powerpoint/2015/main" val="1"/>
+                <p16:designElem xmlns:p16="http://schemas.microsoft.com/office/powerpoint/2015/main" xmlns="" val="1"/>
               </p:ext>
             </p:extLst>
           </p:nvPr>
@@ -21919,7 +21919,7 @@
           <p:cNvPr id="2" name="Tittel 1">
             <a:extLst>
               <a:ext uri="{FF2B5EF4-FFF2-40B4-BE49-F238E27FC236}">
-                <a16:creationId xmlns="" xmlns:a16="http://schemas.microsoft.com/office/drawing/2014/main" id="{DE3D84FB-5D02-47D2-98FD-4F01A02E2AEA}"/>
+                <a16:creationId xmlns:a16="http://schemas.microsoft.com/office/drawing/2014/main" xmlns="" id="{DE3D84FB-5D02-47D2-98FD-4F01A02E2AEA}"/>
               </a:ext>
             </a:extLst>
           </p:cNvPr>
@@ -21966,10 +21966,10 @@
           <p:cNvPr id="23" name="Rett linje 22">
             <a:extLst>
               <a:ext uri="{FF2B5EF4-FFF2-40B4-BE49-F238E27FC236}">
-                <a16:creationId xmlns="" xmlns:a16="http://schemas.microsoft.com/office/drawing/2014/main" id="{62F01714-1A39-4194-BD47-8A9960C59985}"/>
+                <a16:creationId xmlns:a16="http://schemas.microsoft.com/office/drawing/2014/main" xmlns="" id="{62F01714-1A39-4194-BD47-8A9960C59985}"/>
               </a:ext>
               <a:ext uri="{C183D7F6-B498-43B3-948B-1728B52AA6E4}">
-                <adec:decorative xmlns="" xmlns:adec="http://schemas.microsoft.com/office/drawing/2017/decorative" val="1"/>
+                <adec:decorative xmlns:adec="http://schemas.microsoft.com/office/drawing/2017/decorative" xmlns="" val="1"/>
               </a:ext>
             </a:extLst>
           </p:cNvPr>
@@ -21979,7 +21979,7 @@
           <p:nvPr>
             <p:extLst>
               <p:ext uri="{386F3935-93C4-4BCD-93E2-E3B085C9AB24}">
-                <p16:designElem xmlns="" xmlns:p16="http://schemas.microsoft.com/office/powerpoint/2015/main" val="1"/>
+                <p16:designElem xmlns:p16="http://schemas.microsoft.com/office/powerpoint/2015/main" xmlns="" val="1"/>
               </p:ext>
             </p:extLst>
           </p:nvPr>
@@ -22018,7 +22018,7 @@
           <p:cNvPr id="8" name="Tittel 1">
             <a:extLst>
               <a:ext uri="{FF2B5EF4-FFF2-40B4-BE49-F238E27FC236}">
-                <a16:creationId xmlns="" xmlns:a16="http://schemas.microsoft.com/office/drawing/2014/main" id="{DE3D84FB-5D02-47D2-98FD-4F01A02E2AEA}"/>
+                <a16:creationId xmlns:a16="http://schemas.microsoft.com/office/drawing/2014/main" xmlns="" id="{DE3D84FB-5D02-47D2-98FD-4F01A02E2AEA}"/>
               </a:ext>
             </a:extLst>
           </p:cNvPr>
@@ -22070,18 +22070,7 @@
                 <a:ea typeface="+mj-ea"/>
                 <a:cs typeface="+mj-cs"/>
               </a:rPr>
-              <a:t>ncrypt your files to keep your data safe when </a:t>
-            </a:r>
-            <a:r>
-              <a:rPr lang="nb-NO" spc="50" smtClean="0">
-                <a:solidFill>
-                  <a:srgbClr val="FFFFFF"/>
-                </a:solidFill>
-                <a:latin typeface="Book Antiqua" pitchFamily="18" charset="0"/>
-                <a:ea typeface="+mj-ea"/>
-                <a:cs typeface="+mj-cs"/>
-              </a:rPr>
-              <a:t>stored elsewhere</a:t>
+              <a:t>ncrypt your files to keep your data safe when stored elsewhere</a:t>
             </a:r>
             <a:endParaRPr kumimoji="0" lang="nb-NO" i="0" u="none" strike="noStrike" kern="1200" cap="none" spc="50" normalizeH="0" noProof="0">
               <a:ln>
@@ -22105,7 +22094,7 @@
           <p:cNvPr id="13" name="Undertittel 2">
             <a:extLst>
               <a:ext uri="{FF2B5EF4-FFF2-40B4-BE49-F238E27FC236}">
-                <a16:creationId xmlns="" xmlns:a16="http://schemas.microsoft.com/office/drawing/2014/main" id="{E9F6641D-ADF3-40BD-9BA3-E740E77C8826}"/>
+                <a16:creationId xmlns:a16="http://schemas.microsoft.com/office/drawing/2014/main" xmlns="" id="{E9F6641D-ADF3-40BD-9BA3-E740E77C8826}"/>
               </a:ext>
             </a:extLst>
           </p:cNvPr>
@@ -22305,7 +22294,7 @@
     </p:spTree>
     <p:extLst>
       <p:ext uri="{BB962C8B-B14F-4D97-AF65-F5344CB8AC3E}">
-        <p14:creationId xmlns="" xmlns:p14="http://schemas.microsoft.com/office/powerpoint/2010/main" val="2806257027"/>
+        <p14:creationId xmlns:p14="http://schemas.microsoft.com/office/powerpoint/2010/main" xmlns="" val="2806257027"/>
       </p:ext>
     </p:extLst>
   </p:cSld>
@@ -22344,10 +22333,10 @@
           <p:cNvPr id="19" name="Rektangel 18">
             <a:extLst>
               <a:ext uri="{FF2B5EF4-FFF2-40B4-BE49-F238E27FC236}">
-                <a16:creationId xmlns="" xmlns:a16="http://schemas.microsoft.com/office/drawing/2014/main" id="{2FDF0794-1B86-42B2-B8C7-F60123E638ED}"/>
+                <a16:creationId xmlns:a16="http://schemas.microsoft.com/office/drawing/2014/main" xmlns="" id="{2FDF0794-1B86-42B2-B8C7-F60123E638ED}"/>
               </a:ext>
               <a:ext uri="{C183D7F6-B498-43B3-948B-1728B52AA6E4}">
-                <adec:decorative xmlns="" xmlns:adec="http://schemas.microsoft.com/office/drawing/2017/decorative" val="1"/>
+                <adec:decorative xmlns:adec="http://schemas.microsoft.com/office/drawing/2017/decorative" xmlns="" val="1"/>
               </a:ext>
             </a:extLst>
           </p:cNvPr>
@@ -22357,7 +22346,7 @@
           <p:nvPr>
             <p:extLst>
               <p:ext uri="{386F3935-93C4-4BCD-93E2-E3B085C9AB24}">
-                <p16:designElem xmlns="" xmlns:p16="http://schemas.microsoft.com/office/powerpoint/2015/main" val="1"/>
+                <p16:designElem xmlns:p16="http://schemas.microsoft.com/office/powerpoint/2015/main" xmlns="" val="1"/>
               </p:ext>
             </p:extLst>
           </p:nvPr>
@@ -22495,7 +22484,7 @@
           <p:cNvPr id="49" name="Undertittel 2">
             <a:extLst>
               <a:ext uri="{FF2B5EF4-FFF2-40B4-BE49-F238E27FC236}">
-                <a16:creationId xmlns="" xmlns:a16="http://schemas.microsoft.com/office/drawing/2014/main" id="{E9F6641D-ADF3-40BD-9BA3-E740E77C8826}"/>
+                <a16:creationId xmlns:a16="http://schemas.microsoft.com/office/drawing/2014/main" xmlns="" id="{E9F6641D-ADF3-40BD-9BA3-E740E77C8826}"/>
               </a:ext>
             </a:extLst>
           </p:cNvPr>
@@ -22608,7 +22597,7 @@
           <p:cNvPr id="31" name="Tittel 1">
             <a:extLst>
               <a:ext uri="{FF2B5EF4-FFF2-40B4-BE49-F238E27FC236}">
-                <a16:creationId xmlns="" xmlns:a16="http://schemas.microsoft.com/office/drawing/2014/main" id="{DE3D84FB-5D02-47D2-98FD-4F01A02E2AEA}"/>
+                <a16:creationId xmlns:a16="http://schemas.microsoft.com/office/drawing/2014/main" xmlns="" id="{DE3D84FB-5D02-47D2-98FD-4F01A02E2AEA}"/>
               </a:ext>
             </a:extLst>
           </p:cNvPr>
@@ -22674,7 +22663,7 @@
         <p:spPr>
           <a:xfrm>
             <a:off x="1071666" y="1738142"/>
-            <a:ext cx="10181219" cy="3416320"/>
+            <a:ext cx="10181219" cy="2308324"/>
           </a:xfrm>
           <a:prstGeom prst="rect">
             <a:avLst/>
@@ -22690,47 +22679,7 @@
               <a:rPr lang="nb-NO" spc="100" smtClean="0">
                 <a:latin typeface="Book Antiqua" pitchFamily="18" charset="0"/>
               </a:rPr>
-              <a:t>Since you’re here you’re probably curious about how you use </a:t>
-            </a:r>
-            <a:r>
-              <a:rPr lang="nb-NO" spc="100" smtClean="0">
-                <a:latin typeface="Book Antiqua" pitchFamily="18" charset="0"/>
-              </a:rPr>
-              <a:t>the FileEncryption</a:t>
-            </a:r>
-            <a:r>
-              <a:rPr lang="nb-NO" spc="100" smtClean="0">
-                <a:latin typeface="Book Antiqua" pitchFamily="18" charset="0"/>
-              </a:rPr>
-              <a:t> tool.</a:t>
-            </a:r>
-            <a:endParaRPr lang="nb-NO" spc="100" smtClean="0">
-              <a:latin typeface="Book Antiqua" pitchFamily="18" charset="0"/>
-            </a:endParaRPr>
-          </a:p>
-          <a:p>
-            <a:endParaRPr lang="nb-NO" spc="100" smtClean="0">
-              <a:latin typeface="Book Antiqua" pitchFamily="18" charset="0"/>
-            </a:endParaRPr>
-          </a:p>
-          <a:p>
-            <a:r>
-              <a:rPr lang="nb-NO" spc="100" smtClean="0">
-                <a:latin typeface="Book Antiqua" pitchFamily="18" charset="0"/>
-              </a:rPr>
-              <a:t>The truth is you don’t need to read a user manual. </a:t>
-            </a:r>
-            <a:r>
-              <a:rPr lang="nb-NO" spc="100" smtClean="0">
-                <a:latin typeface="Book Antiqua" pitchFamily="18" charset="0"/>
-              </a:rPr>
-              <a:t>All you have to do is to pick </a:t>
-            </a:r>
-            <a:r>
-              <a:rPr lang="nb-NO" spc="100" smtClean="0">
-                <a:latin typeface="Book Antiqua" pitchFamily="18" charset="0"/>
-              </a:rPr>
-              <a:t>your encryption password and start dragging and dropping files to be encrypted.</a:t>
+              <a:t>Since you’re here you’re probably curious about how you use the FileEncryption tool.</a:t>
             </a:r>
           </a:p>
           <a:p>
@@ -22743,53 +22692,8 @@
               <a:rPr lang="nb-NO" spc="100" smtClean="0">
                 <a:latin typeface="Book Antiqua" pitchFamily="18" charset="0"/>
               </a:rPr>
-              <a:t>FileEncryption uses AES-GCM </a:t>
+              <a:t>The truth is you don’t need to read a user manual. All you have to do is to pick your encryption password and start dragging and dropping files to be encrypted.</a:t>
             </a:r>
-            <a:r>
-              <a:rPr lang="nb-NO" spc="100" smtClean="0">
-                <a:latin typeface="Book Antiqua" pitchFamily="18" charset="0"/>
-              </a:rPr>
-              <a:t>cryptography. Has </a:t>
-            </a:r>
-            <a:r>
-              <a:rPr lang="nb-NO" spc="100" smtClean="0">
-                <a:latin typeface="Book Antiqua" pitchFamily="18" charset="0"/>
-              </a:rPr>
-              <a:t>a MIT </a:t>
-            </a:r>
-            <a:r>
-              <a:rPr lang="nb-NO" spc="100" smtClean="0">
-                <a:latin typeface="Book Antiqua" pitchFamily="18" charset="0"/>
-              </a:rPr>
-              <a:t>license.</a:t>
-            </a:r>
-            <a:r>
-              <a:rPr lang="nb-NO" spc="100" smtClean="0">
-                <a:latin typeface="Book Antiqua" pitchFamily="18" charset="0"/>
-              </a:rPr>
-              <a:t> </a:t>
-            </a:r>
-            <a:r>
-              <a:rPr lang="nb-NO" spc="100" smtClean="0">
-                <a:latin typeface="Book Antiqua" pitchFamily="18" charset="0"/>
-              </a:rPr>
-              <a:t>And is </a:t>
-            </a:r>
-            <a:r>
-              <a:rPr lang="nb-NO" spc="100" smtClean="0">
-                <a:latin typeface="Book Antiqua" pitchFamily="18" charset="0"/>
-              </a:rPr>
-              <a:t>free for </a:t>
-            </a:r>
-            <a:r>
-              <a:rPr lang="nb-NO" spc="100" smtClean="0">
-                <a:latin typeface="Book Antiqua" pitchFamily="18" charset="0"/>
-              </a:rPr>
-              <a:t>all.</a:t>
-            </a:r>
-            <a:endParaRPr lang="nb-NO" spc="100" smtClean="0">
-              <a:latin typeface="Book Antiqua" pitchFamily="18" charset="0"/>
-            </a:endParaRPr>
           </a:p>
           <a:p>
             <a:endParaRPr lang="nb-NO" spc="100" smtClean="0">
@@ -22801,31 +22705,32 @@
               <a:rPr lang="nb-NO" spc="100" smtClean="0">
                 <a:latin typeface="Book Antiqua" pitchFamily="18" charset="0"/>
               </a:rPr>
-              <a:t>Executable </a:t>
+              <a:t>FileEncryption uses AES-GCM cryptography. Has a MIT license. And is free for all.</a:t>
+            </a:r>
+          </a:p>
+          <a:p>
+            <a:endParaRPr lang="nb-NO" spc="100" smtClean="0">
+              <a:latin typeface="Book Antiqua" pitchFamily="18" charset="0"/>
+            </a:endParaRPr>
+          </a:p>
+          <a:p>
+            <a:r>
+              <a:rPr lang="nb-NO" spc="100" smtClean="0">
+                <a:latin typeface="Book Antiqua" pitchFamily="18" charset="0"/>
+              </a:rPr>
+              <a:t>Executables and source code can </a:t>
             </a:r>
             <a:r>
               <a:rPr lang="nb-NO" spc="100" smtClean="0">
                 <a:latin typeface="Book Antiqua" pitchFamily="18" charset="0"/>
               </a:rPr>
-              <a:t>and </a:t>
+              <a:t>be found </a:t>
             </a:r>
             <a:r>
               <a:rPr lang="nb-NO" spc="100" smtClean="0">
                 <a:latin typeface="Book Antiqua" pitchFamily="18" charset="0"/>
               </a:rPr>
-              <a:t>checksum </a:t>
-            </a:r>
-            <a:r>
-              <a:rPr lang="nb-NO" spc="100" smtClean="0">
-                <a:latin typeface="Book Antiqua" pitchFamily="18" charset="0"/>
-              </a:rPr>
-              <a:t>can be found </a:t>
-            </a:r>
-            <a:r>
-              <a:rPr lang="nb-NO" spc="100" smtClean="0">
-                <a:latin typeface="Book Antiqua" pitchFamily="18" charset="0"/>
-              </a:rPr>
-              <a:t>at: </a:t>
+              <a:t>at </a:t>
             </a:r>
             <a:r>
               <a:rPr lang="en-US" spc="100" smtClean="0">
@@ -22835,37 +22740,7 @@
                 <a:latin typeface="Book Antiqua" pitchFamily="18" charset="0"/>
                 <a:hlinkClick r:id="rId4"/>
               </a:rPr>
-              <a:t>github.com/</a:t>
-            </a:r>
-            <a:r>
-              <a:rPr lang="en-US" spc="100" err="1" smtClean="0">
-                <a:solidFill>
-                  <a:srgbClr val="000000"/>
-                </a:solidFill>
-                <a:latin typeface="Book Antiqua" pitchFamily="18" charset="0"/>
-                <a:hlinkClick r:id="rId4"/>
-              </a:rPr>
-              <a:t>flaskevann</a:t>
-            </a:r>
-            <a:r>
-              <a:rPr lang="en-US" spc="100" smtClean="0">
-                <a:solidFill>
-                  <a:srgbClr val="000000"/>
-                </a:solidFill>
-                <a:latin typeface="Book Antiqua" pitchFamily="18" charset="0"/>
-                <a:hlinkClick r:id="rId4"/>
-              </a:rPr>
-              <a:t>/</a:t>
-            </a:r>
-            <a:r>
-              <a:rPr lang="en-US" spc="100" err="1" smtClean="0">
-                <a:solidFill>
-                  <a:srgbClr val="000000"/>
-                </a:solidFill>
-                <a:latin typeface="Book Antiqua" pitchFamily="18" charset="0"/>
-                <a:hlinkClick r:id="rId4"/>
-              </a:rPr>
-              <a:t>FileEncryption</a:t>
+              <a:t>github.com/flaskevann/FileEncryption</a:t>
             </a:r>
             <a:endParaRPr lang="en-US" spc="100" smtClean="0">
               <a:solidFill>
@@ -22873,79 +22748,6 @@
               </a:solidFill>
               <a:latin typeface="Book Antiqua" pitchFamily="18" charset="0"/>
             </a:endParaRPr>
-          </a:p>
-          <a:p>
-            <a:endParaRPr lang="en-US" spc="100" smtClean="0">
-              <a:solidFill>
-                <a:srgbClr val="000000"/>
-              </a:solidFill>
-              <a:latin typeface="Book Antiqua" pitchFamily="18" charset="0"/>
-            </a:endParaRPr>
-          </a:p>
-          <a:p>
-            <a:r>
-              <a:rPr lang="en-US" spc="100" smtClean="0">
-                <a:solidFill>
-                  <a:srgbClr val="000000"/>
-                </a:solidFill>
-                <a:latin typeface="Book Antiqua" pitchFamily="18" charset="0"/>
-              </a:rPr>
-              <a:t>I</a:t>
-            </a:r>
-            <a:r>
-              <a:rPr lang="nb-NO" spc="100" smtClean="0">
-                <a:latin typeface="Book Antiqua" pitchFamily="18" charset="0"/>
-              </a:rPr>
-              <a:t>f you don’t trust the uploaded </a:t>
-            </a:r>
-            <a:r>
-              <a:rPr lang="nb-NO" spc="100" smtClean="0">
-                <a:latin typeface="Book Antiqua" pitchFamily="18" charset="0"/>
-              </a:rPr>
-              <a:t>build, </a:t>
-            </a:r>
-            <a:r>
-              <a:rPr lang="nb-NO" spc="100" smtClean="0">
-                <a:latin typeface="Book Antiqua" pitchFamily="18" charset="0"/>
-              </a:rPr>
-              <a:t>feel free to download the </a:t>
-            </a:r>
-            <a:r>
-              <a:rPr lang="nb-NO" spc="100" smtClean="0">
-                <a:latin typeface="Book Antiqua" pitchFamily="18" charset="0"/>
-              </a:rPr>
-              <a:t>project </a:t>
-            </a:r>
-            <a:r>
-              <a:rPr lang="nb-NO" spc="100" smtClean="0">
-                <a:latin typeface="Book Antiqua" pitchFamily="18" charset="0"/>
-              </a:rPr>
-              <a:t>yourself and make your own. After installing the needed </a:t>
-            </a:r>
-            <a:r>
-              <a:rPr lang="nb-NO" spc="100" smtClean="0">
-                <a:latin typeface="Book Antiqua" pitchFamily="18" charset="0"/>
-              </a:rPr>
-              <a:t>NET </a:t>
-            </a:r>
-            <a:r>
-              <a:rPr lang="nb-NO" spc="100" smtClean="0">
-                <a:latin typeface="Book Antiqua" pitchFamily="18" charset="0"/>
-              </a:rPr>
-              <a:t>Core tools all you have to do is to run the </a:t>
-            </a:r>
-            <a:r>
-              <a:rPr lang="nb-NO" spc="100" smtClean="0">
-                <a:latin typeface="Book Antiqua" pitchFamily="18" charset="0"/>
-              </a:rPr>
-              <a:t>build command</a:t>
-            </a:r>
-            <a:r>
-              <a:rPr lang="nb-NO" spc="100" smtClean="0">
-                <a:latin typeface="Book Antiqua" pitchFamily="18" charset="0"/>
-              </a:rPr>
-              <a:t>.</a:t>
-            </a:r>
           </a:p>
         </p:txBody>
       </p:sp>
@@ -22978,7 +22780,7 @@
           <p:cNvPr id="11" name="Tittel 1">
             <a:extLst>
               <a:ext uri="{FF2B5EF4-FFF2-40B4-BE49-F238E27FC236}">
-                <a16:creationId xmlns="" xmlns:a16="http://schemas.microsoft.com/office/drawing/2014/main" id="{DE3D84FB-5D02-47D2-98FD-4F01A02E2AEA}"/>
+                <a16:creationId xmlns:a16="http://schemas.microsoft.com/office/drawing/2014/main" xmlns="" id="{DE3D84FB-5D02-47D2-98FD-4F01A02E2AEA}"/>
               </a:ext>
             </a:extLst>
           </p:cNvPr>
@@ -23040,7 +22842,7 @@
     </p:spTree>
     <p:extLst>
       <p:ext uri="{BB962C8B-B14F-4D97-AF65-F5344CB8AC3E}">
-        <p14:creationId xmlns="" xmlns:p14="http://schemas.microsoft.com/office/powerpoint/2010/main" val="2806257027"/>
+        <p14:creationId xmlns:p14="http://schemas.microsoft.com/office/powerpoint/2010/main" xmlns="" val="2806257027"/>
       </p:ext>
     </p:extLst>
   </p:cSld>
@@ -23079,10 +22881,10 @@
           <p:cNvPr id="19" name="Rektangel 18">
             <a:extLst>
               <a:ext uri="{FF2B5EF4-FFF2-40B4-BE49-F238E27FC236}">
-                <a16:creationId xmlns="" xmlns:a16="http://schemas.microsoft.com/office/drawing/2014/main" id="{2FDF0794-1B86-42B2-B8C7-F60123E638ED}"/>
+                <a16:creationId xmlns:a16="http://schemas.microsoft.com/office/drawing/2014/main" xmlns="" id="{2FDF0794-1B86-42B2-B8C7-F60123E638ED}"/>
               </a:ext>
               <a:ext uri="{C183D7F6-B498-43B3-948B-1728B52AA6E4}">
-                <adec:decorative xmlns="" xmlns:adec="http://schemas.microsoft.com/office/drawing/2017/decorative" val="1"/>
+                <adec:decorative xmlns:adec="http://schemas.microsoft.com/office/drawing/2017/decorative" xmlns="" val="1"/>
               </a:ext>
             </a:extLst>
           </p:cNvPr>
@@ -23092,7 +22894,7 @@
           <p:nvPr>
             <p:extLst>
               <p:ext uri="{386F3935-93C4-4BCD-93E2-E3B085C9AB24}">
-                <p16:designElem xmlns="" xmlns:p16="http://schemas.microsoft.com/office/powerpoint/2015/main" val="1"/>
+                <p16:designElem xmlns:p16="http://schemas.microsoft.com/office/powerpoint/2015/main" xmlns="" val="1"/>
               </p:ext>
             </p:extLst>
           </p:nvPr>
@@ -23230,7 +23032,7 @@
           <p:cNvPr id="49" name="Undertittel 2">
             <a:extLst>
               <a:ext uri="{FF2B5EF4-FFF2-40B4-BE49-F238E27FC236}">
-                <a16:creationId xmlns="" xmlns:a16="http://schemas.microsoft.com/office/drawing/2014/main" id="{E9F6641D-ADF3-40BD-9BA3-E740E77C8826}"/>
+                <a16:creationId xmlns:a16="http://schemas.microsoft.com/office/drawing/2014/main" xmlns="" id="{E9F6641D-ADF3-40BD-9BA3-E740E77C8826}"/>
               </a:ext>
             </a:extLst>
           </p:cNvPr>
@@ -23343,7 +23145,7 @@
           <p:cNvPr id="31" name="Tittel 1">
             <a:extLst>
               <a:ext uri="{FF2B5EF4-FFF2-40B4-BE49-F238E27FC236}">
-                <a16:creationId xmlns="" xmlns:a16="http://schemas.microsoft.com/office/drawing/2014/main" id="{DE3D84FB-5D02-47D2-98FD-4F01A02E2AEA}"/>
+                <a16:creationId xmlns:a16="http://schemas.microsoft.com/office/drawing/2014/main" xmlns="" id="{DE3D84FB-5D02-47D2-98FD-4F01A02E2AEA}"/>
               </a:ext>
             </a:extLst>
           </p:cNvPr>
@@ -23425,19 +23227,7 @@
               <a:rPr lang="nb-NO" spc="100" smtClean="0">
                 <a:latin typeface="Book Antiqua" pitchFamily="18" charset="0"/>
               </a:rPr>
-              <a:t>Before encrypting or decrypting any files you must type </a:t>
-            </a:r>
-            <a:r>
-              <a:rPr lang="nb-NO" spc="100" smtClean="0">
-                <a:latin typeface="Book Antiqua" pitchFamily="18" charset="0"/>
-              </a:rPr>
-              <a:t>a file </a:t>
-            </a:r>
-            <a:r>
-              <a:rPr lang="nb-NO" spc="100" smtClean="0">
-                <a:latin typeface="Book Antiqua" pitchFamily="18" charset="0"/>
-              </a:rPr>
-              <a:t>encryption password:</a:t>
+              <a:t>Before encrypting or decrypting any files you must type a file encryption password:</a:t>
             </a:r>
           </a:p>
         </p:txBody>
@@ -23471,7 +23261,7 @@
           <p:cNvPr id="11" name="Tittel 1">
             <a:extLst>
               <a:ext uri="{FF2B5EF4-FFF2-40B4-BE49-F238E27FC236}">
-                <a16:creationId xmlns="" xmlns:a16="http://schemas.microsoft.com/office/drawing/2014/main" id="{DE3D84FB-5D02-47D2-98FD-4F01A02E2AEA}"/>
+                <a16:creationId xmlns:a16="http://schemas.microsoft.com/office/drawing/2014/main" xmlns="" id="{DE3D84FB-5D02-47D2-98FD-4F01A02E2AEA}"/>
               </a:ext>
             </a:extLst>
           </p:cNvPr>
@@ -23564,7 +23354,7 @@
     </p:spTree>
     <p:extLst>
       <p:ext uri="{BB962C8B-B14F-4D97-AF65-F5344CB8AC3E}">
-        <p14:creationId xmlns="" xmlns:p14="http://schemas.microsoft.com/office/powerpoint/2010/main" val="2806257027"/>
+        <p14:creationId xmlns:p14="http://schemas.microsoft.com/office/powerpoint/2010/main" xmlns="" val="2806257027"/>
       </p:ext>
     </p:extLst>
   </p:cSld>
@@ -23603,10 +23393,10 @@
           <p:cNvPr id="19" name="Rektangel 18">
             <a:extLst>
               <a:ext uri="{FF2B5EF4-FFF2-40B4-BE49-F238E27FC236}">
-                <a16:creationId xmlns="" xmlns:a16="http://schemas.microsoft.com/office/drawing/2014/main" id="{2FDF0794-1B86-42B2-B8C7-F60123E638ED}"/>
+                <a16:creationId xmlns:a16="http://schemas.microsoft.com/office/drawing/2014/main" xmlns="" id="{2FDF0794-1B86-42B2-B8C7-F60123E638ED}"/>
               </a:ext>
               <a:ext uri="{C183D7F6-B498-43B3-948B-1728B52AA6E4}">
-                <adec:decorative xmlns="" xmlns:adec="http://schemas.microsoft.com/office/drawing/2017/decorative" val="1"/>
+                <adec:decorative xmlns:adec="http://schemas.microsoft.com/office/drawing/2017/decorative" xmlns="" val="1"/>
               </a:ext>
             </a:extLst>
           </p:cNvPr>
@@ -23616,7 +23406,7 @@
           <p:nvPr>
             <p:extLst>
               <p:ext uri="{386F3935-93C4-4BCD-93E2-E3B085C9AB24}">
-                <p16:designElem xmlns="" xmlns:p16="http://schemas.microsoft.com/office/powerpoint/2015/main" val="1"/>
+                <p16:designElem xmlns:p16="http://schemas.microsoft.com/office/powerpoint/2015/main" xmlns="" val="1"/>
               </p:ext>
             </p:extLst>
           </p:nvPr>
@@ -23754,7 +23544,7 @@
           <p:cNvPr id="49" name="Undertittel 2">
             <a:extLst>
               <a:ext uri="{FF2B5EF4-FFF2-40B4-BE49-F238E27FC236}">
-                <a16:creationId xmlns="" xmlns:a16="http://schemas.microsoft.com/office/drawing/2014/main" id="{E9F6641D-ADF3-40BD-9BA3-E740E77C8826}"/>
+                <a16:creationId xmlns:a16="http://schemas.microsoft.com/office/drawing/2014/main" xmlns="" id="{E9F6641D-ADF3-40BD-9BA3-E740E77C8826}"/>
               </a:ext>
             </a:extLst>
           </p:cNvPr>
@@ -23867,7 +23657,7 @@
           <p:cNvPr id="31" name="Tittel 1">
             <a:extLst>
               <a:ext uri="{FF2B5EF4-FFF2-40B4-BE49-F238E27FC236}">
-                <a16:creationId xmlns="" xmlns:a16="http://schemas.microsoft.com/office/drawing/2014/main" id="{DE3D84FB-5D02-47D2-98FD-4F01A02E2AEA}"/>
+                <a16:creationId xmlns:a16="http://schemas.microsoft.com/office/drawing/2014/main" xmlns="" id="{DE3D84FB-5D02-47D2-98FD-4F01A02E2AEA}"/>
               </a:ext>
             </a:extLst>
           </p:cNvPr>
@@ -23952,9 +23742,6 @@
               </a:rPr>
               <a:t>A simple example showing two JPG-files getting encrypted:</a:t>
             </a:r>
-            <a:endParaRPr lang="nb-NO" spc="100" smtClean="0">
-              <a:latin typeface="Book Antiqua" pitchFamily="18" charset="0"/>
-            </a:endParaRPr>
           </a:p>
         </p:txBody>
       </p:sp>
@@ -23987,7 +23774,7 @@
           <p:cNvPr id="11" name="Tittel 1">
             <a:extLst>
               <a:ext uri="{FF2B5EF4-FFF2-40B4-BE49-F238E27FC236}">
-                <a16:creationId xmlns="" xmlns:a16="http://schemas.microsoft.com/office/drawing/2014/main" id="{DE3D84FB-5D02-47D2-98FD-4F01A02E2AEA}"/>
+                <a16:creationId xmlns:a16="http://schemas.microsoft.com/office/drawing/2014/main" xmlns="" id="{DE3D84FB-5D02-47D2-98FD-4F01A02E2AEA}"/>
               </a:ext>
             </a:extLst>
           </p:cNvPr>
@@ -24222,7 +24009,7 @@
     </p:spTree>
     <p:extLst>
       <p:ext uri="{BB962C8B-B14F-4D97-AF65-F5344CB8AC3E}">
-        <p14:creationId xmlns="" xmlns:p14="http://schemas.microsoft.com/office/powerpoint/2010/main" val="2806257027"/>
+        <p14:creationId xmlns:p14="http://schemas.microsoft.com/office/powerpoint/2010/main" xmlns="" val="2806257027"/>
       </p:ext>
     </p:extLst>
   </p:cSld>
@@ -24261,10 +24048,10 @@
           <p:cNvPr id="19" name="Rektangel 18">
             <a:extLst>
               <a:ext uri="{FF2B5EF4-FFF2-40B4-BE49-F238E27FC236}">
-                <a16:creationId xmlns="" xmlns:a16="http://schemas.microsoft.com/office/drawing/2014/main" id="{2FDF0794-1B86-42B2-B8C7-F60123E638ED}"/>
+                <a16:creationId xmlns:a16="http://schemas.microsoft.com/office/drawing/2014/main" xmlns="" id="{2FDF0794-1B86-42B2-B8C7-F60123E638ED}"/>
               </a:ext>
               <a:ext uri="{C183D7F6-B498-43B3-948B-1728B52AA6E4}">
-                <adec:decorative xmlns="" xmlns:adec="http://schemas.microsoft.com/office/drawing/2017/decorative" val="1"/>
+                <adec:decorative xmlns:adec="http://schemas.microsoft.com/office/drawing/2017/decorative" xmlns="" val="1"/>
               </a:ext>
             </a:extLst>
           </p:cNvPr>
@@ -24274,7 +24061,7 @@
           <p:nvPr>
             <p:extLst>
               <p:ext uri="{386F3935-93C4-4BCD-93E2-E3B085C9AB24}">
-                <p16:designElem xmlns="" xmlns:p16="http://schemas.microsoft.com/office/powerpoint/2015/main" val="1"/>
+                <p16:designElem xmlns:p16="http://schemas.microsoft.com/office/powerpoint/2015/main" xmlns="" val="1"/>
               </p:ext>
             </p:extLst>
           </p:nvPr>
@@ -24412,7 +24199,7 @@
           <p:cNvPr id="49" name="Undertittel 2">
             <a:extLst>
               <a:ext uri="{FF2B5EF4-FFF2-40B4-BE49-F238E27FC236}">
-                <a16:creationId xmlns="" xmlns:a16="http://schemas.microsoft.com/office/drawing/2014/main" id="{E9F6641D-ADF3-40BD-9BA3-E740E77C8826}"/>
+                <a16:creationId xmlns:a16="http://schemas.microsoft.com/office/drawing/2014/main" xmlns="" id="{E9F6641D-ADF3-40BD-9BA3-E740E77C8826}"/>
               </a:ext>
             </a:extLst>
           </p:cNvPr>
@@ -24525,7 +24312,7 @@
           <p:cNvPr id="31" name="Tittel 1">
             <a:extLst>
               <a:ext uri="{FF2B5EF4-FFF2-40B4-BE49-F238E27FC236}">
-                <a16:creationId xmlns="" xmlns:a16="http://schemas.microsoft.com/office/drawing/2014/main" id="{DE3D84FB-5D02-47D2-98FD-4F01A02E2AEA}"/>
+                <a16:creationId xmlns:a16="http://schemas.microsoft.com/office/drawing/2014/main" xmlns="" id="{DE3D84FB-5D02-47D2-98FD-4F01A02E2AEA}"/>
               </a:ext>
             </a:extLst>
           </p:cNvPr>
@@ -24608,13 +24395,7 @@
               <a:rPr lang="nb-NO" spc="100" smtClean="0">
                 <a:latin typeface="Book Antiqua" pitchFamily="18" charset="0"/>
               </a:rPr>
-              <a:t>Later </a:t>
-            </a:r>
-            <a:r>
-              <a:rPr lang="nb-NO" spc="100" smtClean="0">
-                <a:latin typeface="Book Antiqua" pitchFamily="18" charset="0"/>
-              </a:rPr>
-              <a:t>when the encrypted files needs to be decrypted:</a:t>
+              <a:t>Later when the encrypted files needs to be decrypted:</a:t>
             </a:r>
           </a:p>
         </p:txBody>
@@ -24648,7 +24429,7 @@
           <p:cNvPr id="11" name="Tittel 1">
             <a:extLst>
               <a:ext uri="{FF2B5EF4-FFF2-40B4-BE49-F238E27FC236}">
-                <a16:creationId xmlns="" xmlns:a16="http://schemas.microsoft.com/office/drawing/2014/main" id="{DE3D84FB-5D02-47D2-98FD-4F01A02E2AEA}"/>
+                <a16:creationId xmlns:a16="http://schemas.microsoft.com/office/drawing/2014/main" xmlns="" id="{DE3D84FB-5D02-47D2-98FD-4F01A02E2AEA}"/>
               </a:ext>
             </a:extLst>
           </p:cNvPr>
@@ -24732,13 +24513,7 @@
               <a:rPr lang="en-US" spc="100" smtClean="0">
                 <a:latin typeface="Book Antiqua" pitchFamily="18" charset="0"/>
               </a:rPr>
-              <a:t>(If you use the wrong password, or try to decrypt a file that’s not encrypted, you get an </a:t>
-            </a:r>
-            <a:r>
-              <a:rPr lang="en-US" spc="100" smtClean="0">
-                <a:latin typeface="Book Antiqua" pitchFamily="18" charset="0"/>
-              </a:rPr>
-              <a:t>error!)</a:t>
+              <a:t>(If you use the wrong password, or try to decrypt a file that’s not encrypted, you get an error!)</a:t>
             </a:r>
             <a:endParaRPr lang="nb-NO"/>
           </a:p>
@@ -24952,13 +24727,7 @@
               <a:rPr lang="en-US" b="1" spc="100" smtClean="0">
                 <a:latin typeface="Book Antiqua" pitchFamily="18" charset="0"/>
               </a:rPr>
-              <a:t>Be careful not to lose your encryption password. If you do, your data is </a:t>
-            </a:r>
-            <a:r>
-              <a:rPr lang="en-US" b="1" spc="100" smtClean="0">
-                <a:latin typeface="Book Antiqua" pitchFamily="18" charset="0"/>
-              </a:rPr>
-              <a:t>lost forever.</a:t>
+              <a:t>Be careful not to lose your encryption password. If you do, your data is lost forever.</a:t>
             </a:r>
             <a:endParaRPr lang="nb-NO" b="1"/>
           </a:p>
@@ -24967,7 +24736,7 @@
     </p:spTree>
     <p:extLst>
       <p:ext uri="{BB962C8B-B14F-4D97-AF65-F5344CB8AC3E}">
-        <p14:creationId xmlns="" xmlns:p14="http://schemas.microsoft.com/office/powerpoint/2010/main" val="2806257027"/>
+        <p14:creationId xmlns:p14="http://schemas.microsoft.com/office/powerpoint/2010/main" xmlns="" val="2806257027"/>
       </p:ext>
     </p:extLst>
   </p:cSld>
@@ -25006,10 +24775,10 @@
           <p:cNvPr id="19" name="Rektangel 18">
             <a:extLst>
               <a:ext uri="{FF2B5EF4-FFF2-40B4-BE49-F238E27FC236}">
-                <a16:creationId xmlns="" xmlns:a16="http://schemas.microsoft.com/office/drawing/2014/main" id="{2FDF0794-1B86-42B2-B8C7-F60123E638ED}"/>
+                <a16:creationId xmlns:a16="http://schemas.microsoft.com/office/drawing/2014/main" xmlns="" id="{2FDF0794-1B86-42B2-B8C7-F60123E638ED}"/>
               </a:ext>
               <a:ext uri="{C183D7F6-B498-43B3-948B-1728B52AA6E4}">
-                <adec:decorative xmlns="" xmlns:adec="http://schemas.microsoft.com/office/drawing/2017/decorative" val="1"/>
+                <adec:decorative xmlns:adec="http://schemas.microsoft.com/office/drawing/2017/decorative" xmlns="" val="1"/>
               </a:ext>
             </a:extLst>
           </p:cNvPr>
@@ -25019,7 +24788,7 @@
           <p:nvPr>
             <p:extLst>
               <p:ext uri="{386F3935-93C4-4BCD-93E2-E3B085C9AB24}">
-                <p16:designElem xmlns="" xmlns:p16="http://schemas.microsoft.com/office/powerpoint/2015/main" val="1"/>
+                <p16:designElem xmlns:p16="http://schemas.microsoft.com/office/powerpoint/2015/main" xmlns="" val="1"/>
               </p:ext>
             </p:extLst>
           </p:nvPr>
@@ -25095,10 +24864,10 @@
           <p:cNvPr id="21" name="Rektangel 20">
             <a:extLst>
               <a:ext uri="{FF2B5EF4-FFF2-40B4-BE49-F238E27FC236}">
-                <a16:creationId xmlns="" xmlns:a16="http://schemas.microsoft.com/office/drawing/2014/main" id="{EAA48FC5-3C83-4F1B-BC33-DF0B588F8317}"/>
+                <a16:creationId xmlns:a16="http://schemas.microsoft.com/office/drawing/2014/main" xmlns="" id="{EAA48FC5-3C83-4F1B-BC33-DF0B588F8317}"/>
               </a:ext>
               <a:ext uri="{C183D7F6-B498-43B3-948B-1728B52AA6E4}">
-                <adec:decorative xmlns="" xmlns:adec="http://schemas.microsoft.com/office/drawing/2017/decorative" val="1"/>
+                <adec:decorative xmlns:adec="http://schemas.microsoft.com/office/drawing/2017/decorative" xmlns="" val="1"/>
               </a:ext>
             </a:extLst>
           </p:cNvPr>
@@ -25108,7 +24877,7 @@
           <p:nvPr>
             <p:extLst>
               <p:ext uri="{386F3935-93C4-4BCD-93E2-E3B085C9AB24}">
-                <p16:designElem xmlns="" xmlns:p16="http://schemas.microsoft.com/office/powerpoint/2015/main" val="1"/>
+                <p16:designElem xmlns:p16="http://schemas.microsoft.com/office/powerpoint/2015/main" xmlns="" val="1"/>
               </p:ext>
             </p:extLst>
           </p:nvPr>
@@ -25158,10 +24927,10 @@
           <p:cNvPr id="23" name="Rett linje 22">
             <a:extLst>
               <a:ext uri="{FF2B5EF4-FFF2-40B4-BE49-F238E27FC236}">
-                <a16:creationId xmlns="" xmlns:a16="http://schemas.microsoft.com/office/drawing/2014/main" id="{62F01714-1A39-4194-BD47-8A9960C59985}"/>
+                <a16:creationId xmlns:a16="http://schemas.microsoft.com/office/drawing/2014/main" xmlns="" id="{62F01714-1A39-4194-BD47-8A9960C59985}"/>
               </a:ext>
               <a:ext uri="{C183D7F6-B498-43B3-948B-1728B52AA6E4}">
-                <adec:decorative xmlns="" xmlns:adec="http://schemas.microsoft.com/office/drawing/2017/decorative" val="1"/>
+                <adec:decorative xmlns:adec="http://schemas.microsoft.com/office/drawing/2017/decorative" xmlns="" val="1"/>
               </a:ext>
             </a:extLst>
           </p:cNvPr>
@@ -25171,7 +24940,7 @@
           <p:nvPr>
             <p:extLst>
               <p:ext uri="{386F3935-93C4-4BCD-93E2-E3B085C9AB24}">
-                <p16:designElem xmlns="" xmlns:p16="http://schemas.microsoft.com/office/powerpoint/2015/main" val="1"/>
+                <p16:designElem xmlns:p16="http://schemas.microsoft.com/office/powerpoint/2015/main" xmlns="" val="1"/>
               </p:ext>
             </p:extLst>
           </p:nvPr>
@@ -25210,7 +24979,7 @@
           <p:cNvPr id="11" name="Tittel 1">
             <a:extLst>
               <a:ext uri="{FF2B5EF4-FFF2-40B4-BE49-F238E27FC236}">
-                <a16:creationId xmlns="" xmlns:a16="http://schemas.microsoft.com/office/drawing/2014/main" id="{DE3D84FB-5D02-47D2-98FD-4F01A02E2AEA}"/>
+                <a16:creationId xmlns:a16="http://schemas.microsoft.com/office/drawing/2014/main" xmlns="" id="{DE3D84FB-5D02-47D2-98FD-4F01A02E2AEA}"/>
               </a:ext>
             </a:extLst>
           </p:cNvPr>
@@ -25281,7 +25050,7 @@
           <p:cNvPr id="13" name="Undertittel 2">
             <a:extLst>
               <a:ext uri="{FF2B5EF4-FFF2-40B4-BE49-F238E27FC236}">
-                <a16:creationId xmlns="" xmlns:a16="http://schemas.microsoft.com/office/drawing/2014/main" id="{E9F6641D-ADF3-40BD-9BA3-E740E77C8826}"/>
+                <a16:creationId xmlns:a16="http://schemas.microsoft.com/office/drawing/2014/main" xmlns="" id="{E9F6641D-ADF3-40BD-9BA3-E740E77C8826}"/>
               </a:ext>
             </a:extLst>
           </p:cNvPr>
@@ -25392,7 +25161,7 @@
           <p:cNvPr id="14" name="Tittel 1">
             <a:extLst>
               <a:ext uri="{FF2B5EF4-FFF2-40B4-BE49-F238E27FC236}">
-                <a16:creationId xmlns="" xmlns:a16="http://schemas.microsoft.com/office/drawing/2014/main" id="{DE3D84FB-5D02-47D2-98FD-4F01A02E2AEA}"/>
+                <a16:creationId xmlns:a16="http://schemas.microsoft.com/office/drawing/2014/main" xmlns="" id="{DE3D84FB-5D02-47D2-98FD-4F01A02E2AEA}"/>
               </a:ext>
             </a:extLst>
           </p:cNvPr>
@@ -25472,7 +25241,7 @@
     </p:spTree>
     <p:extLst>
       <p:ext uri="{BB962C8B-B14F-4D97-AF65-F5344CB8AC3E}">
-        <p14:creationId xmlns="" xmlns:p14="http://schemas.microsoft.com/office/powerpoint/2010/main" val="2806257027"/>
+        <p14:creationId xmlns:p14="http://schemas.microsoft.com/office/powerpoint/2010/main" xmlns="" val="2806257027"/>
       </p:ext>
     </p:extLst>
   </p:cSld>
@@ -25751,7 +25520,7 @@
   <a:extraClrSchemeLst/>
   <a:extLst>
     <a:ext uri="{05A4C25C-085E-4340-85A3-A5531E510DB2}">
-      <thm15:themeFamily xmlns="" xmlns:thm15="http://schemas.microsoft.com/office/thememl/2012/main" name="Office_36806131_TF22378848.potx" id="{7BDC147E-176A-4D98-8CC4-64128EFA1A5C}" vid="{2F9CCCA7-5DF8-4474-972E-AC4DFBF24487}"/>
+      <thm15:themeFamily xmlns:thm15="http://schemas.microsoft.com/office/thememl/2012/main" xmlns="" name="Office_36806131_TF22378848.potx" id="{7BDC147E-176A-4D98-8CC4-64128EFA1A5C}" vid="{2F9CCCA7-5DF8-4474-972E-AC4DFBF24487}"/>
     </a:ext>
   </a:extLst>
 </a:theme>
@@ -26046,7 +25815,7 @@
   <a:extraClrSchemeLst/>
   <a:extLst>
     <a:ext uri="{05A4C25C-085E-4340-85A3-A5531E510DB2}">
-      <thm15:themeFamily xmlns="" xmlns:thm15="http://schemas.microsoft.com/office/thememl/2012/main" name="Office Theme" id="{62F939B6-93AF-4DB8-9C6B-D6C7DFDC589F}" vid="{4A3C46E8-61CC-4603-A589-7422A47A8E4A}"/>
+      <thm15:themeFamily xmlns:thm15="http://schemas.microsoft.com/office/thememl/2012/main" xmlns="" name="Office Theme" id="{62F939B6-93AF-4DB8-9C6B-D6C7DFDC589F}" vid="{4A3C46E8-61CC-4603-A589-7422A47A8E4A}"/>
     </a:ext>
   </a:extLst>
 </a:theme>
@@ -26307,19 +26076,18 @@
   <a:extraClrSchemeLst/>
   <a:extLst>
     <a:ext uri="{05A4C25C-085E-4340-85A3-A5531E510DB2}">
-      <thm15:themeFamily xmlns="" xmlns:thm15="http://schemas.microsoft.com/office/thememl/2012/main" name="Office Theme" id="{62F939B6-93AF-4DB8-9C6B-D6C7DFDC589F}" vid="{4A3C46E8-61CC-4603-A589-7422A47A8E4A}"/>
+      <thm15:themeFamily xmlns:thm15="http://schemas.microsoft.com/office/thememl/2012/main" xmlns="" name="Office Theme" id="{62F939B6-93AF-4DB8-9C6B-D6C7DFDC589F}" vid="{4A3C46E8-61CC-4603-A589-7422A47A8E4A}"/>
     </a:ext>
   </a:extLst>
 </a:theme>
 </file>
 
 <file path=customXml/item1.xml><?xml version="1.0" encoding="utf-8"?>
-<?mso-contentType ?>
-<FormTemplates xmlns="http://schemas.microsoft.com/sharepoint/v3/contenttype/forms">
-  <Display>DocumentLibraryForm</Display>
-  <Edit>DocumentLibraryForm</Edit>
-  <New>DocumentLibraryForm</New>
-</FormTemplates>
+<p:properties xmlns:p="http://schemas.microsoft.com/office/2006/metadata/properties" xmlns:xsi="http://www.w3.org/2001/XMLSchema-instance" xmlns:pc="http://schemas.microsoft.com/office/infopath/2007/PartnerControls">
+  <documentManagement>
+    <MediaServiceKeyPoints xmlns="71af3243-3dd4-4a8d-8c0d-dd76da1f02a5" xsi:nil="true"/>
+  </documentManagement>
+</p:properties>
 </file>
 
 <file path=customXml/item2.xml><?xml version="1.0" encoding="utf-8"?>
@@ -26534,17 +26302,20 @@
 </file>
 
 <file path=customXml/item3.xml><?xml version="1.0" encoding="utf-8"?>
-<p:properties xmlns:p="http://schemas.microsoft.com/office/2006/metadata/properties" xmlns:xsi="http://www.w3.org/2001/XMLSchema-instance" xmlns:pc="http://schemas.microsoft.com/office/infopath/2007/PartnerControls">
-  <documentManagement>
-    <MediaServiceKeyPoints xmlns="71af3243-3dd4-4a8d-8c0d-dd76da1f02a5" xsi:nil="true"/>
-  </documentManagement>
-</p:properties>
+<?mso-contentType ?>
+<FormTemplates xmlns="http://schemas.microsoft.com/sharepoint/v3/contenttype/forms">
+  <Display>DocumentLibraryForm</Display>
+  <Edit>DocumentLibraryForm</Edit>
+  <New>DocumentLibraryForm</New>
+</FormTemplates>
 </file>
 
 <file path=customXml/itemProps1.xml><?xml version="1.0" encoding="utf-8"?>
-<ds:datastoreItem xmlns:ds="http://schemas.openxmlformats.org/officeDocument/2006/customXml" ds:itemID="{4F44C90D-2A62-4985-9618-3460247437B1}">
+<ds:datastoreItem xmlns:ds="http://schemas.openxmlformats.org/officeDocument/2006/customXml" ds:itemID="{788A2F88-55C5-4ED1-9541-807C65424763}">
   <ds:schemaRefs>
-    <ds:schemaRef ds:uri="http://schemas.microsoft.com/sharepoint/v3/contenttype/forms"/>
+    <ds:schemaRef ds:uri="http://schemas.microsoft.com/office/2006/metadata/properties"/>
+    <ds:schemaRef ds:uri="http://schemas.microsoft.com/office/infopath/2007/PartnerControls"/>
+    <ds:schemaRef ds:uri="71af3243-3dd4-4a8d-8c0d-dd76da1f02a5"/>
   </ds:schemaRefs>
 </ds:datastoreItem>
 </file>
@@ -26569,11 +26340,9 @@
 </file>
 
 <file path=customXml/itemProps3.xml><?xml version="1.0" encoding="utf-8"?>
-<ds:datastoreItem xmlns:ds="http://schemas.openxmlformats.org/officeDocument/2006/customXml" ds:itemID="{788A2F88-55C5-4ED1-9541-807C65424763}">
+<ds:datastoreItem xmlns:ds="http://schemas.openxmlformats.org/officeDocument/2006/customXml" ds:itemID="{4F44C90D-2A62-4985-9618-3460247437B1}">
   <ds:schemaRefs>
-    <ds:schemaRef ds:uri="http://schemas.microsoft.com/office/2006/metadata/properties"/>
-    <ds:schemaRef ds:uri="http://schemas.microsoft.com/office/infopath/2007/PartnerControls"/>
-    <ds:schemaRef ds:uri="71af3243-3dd4-4a8d-8c0d-dd76da1f02a5"/>
+    <ds:schemaRef ds:uri="http://schemas.microsoft.com/sharepoint/v3/contenttype/forms"/>
   </ds:schemaRefs>
 </ds:datastoreItem>
 </file>
</xml_diff>